<commit_message>
fixed favicon, added logo to flathood_base nav-bar
</commit_message>
<xml_diff>
--- a/FRONT_END/logo_lab/logo_lab_ppt.pptx
+++ b/FRONT_END/logo_lab/logo_lab_ppt.pptx
@@ -8,6 +8,8 @@
     <p:sldId id="256" r:id="rId2"/>
     <p:sldId id="257" r:id="rId3"/>
     <p:sldId id="258" r:id="rId4"/>
+    <p:sldId id="259" r:id="rId5"/>
+    <p:sldId id="260" r:id="rId6"/>
   </p:sldIdLst>
   <p:sldSz cx="9144000" cy="6858000" type="screen4x3"/>
   <p:notesSz cx="6858000" cy="9144000"/>
@@ -290,7 +292,7 @@
           <a:p>
             <a:fld id="{3FFBA1A1-BC73-0D4C-8BA3-CA5ADE3DA08B}" type="datetimeFigureOut">
               <a:rPr lang="en-US" smtClean="0"/>
-              <a:t>5/1/14</a:t>
+              <a:t>5/4/14</a:t>
             </a:fld>
             <a:endParaRPr lang="en-US"/>
           </a:p>
@@ -460,7 +462,7 @@
           <a:p>
             <a:fld id="{3FFBA1A1-BC73-0D4C-8BA3-CA5ADE3DA08B}" type="datetimeFigureOut">
               <a:rPr lang="en-US" smtClean="0"/>
-              <a:t>5/1/14</a:t>
+              <a:t>5/4/14</a:t>
             </a:fld>
             <a:endParaRPr lang="en-US"/>
           </a:p>
@@ -640,7 +642,7 @@
           <a:p>
             <a:fld id="{3FFBA1A1-BC73-0D4C-8BA3-CA5ADE3DA08B}" type="datetimeFigureOut">
               <a:rPr lang="en-US" smtClean="0"/>
-              <a:t>5/1/14</a:t>
+              <a:t>5/4/14</a:t>
             </a:fld>
             <a:endParaRPr lang="en-US"/>
           </a:p>
@@ -810,7 +812,7 @@
           <a:p>
             <a:fld id="{3FFBA1A1-BC73-0D4C-8BA3-CA5ADE3DA08B}" type="datetimeFigureOut">
               <a:rPr lang="en-US" smtClean="0"/>
-              <a:t>5/1/14</a:t>
+              <a:t>5/4/14</a:t>
             </a:fld>
             <a:endParaRPr lang="en-US"/>
           </a:p>
@@ -1056,7 +1058,7 @@
           <a:p>
             <a:fld id="{3FFBA1A1-BC73-0D4C-8BA3-CA5ADE3DA08B}" type="datetimeFigureOut">
               <a:rPr lang="en-US" smtClean="0"/>
-              <a:t>5/1/14</a:t>
+              <a:t>5/4/14</a:t>
             </a:fld>
             <a:endParaRPr lang="en-US"/>
           </a:p>
@@ -1344,7 +1346,7 @@
           <a:p>
             <a:fld id="{3FFBA1A1-BC73-0D4C-8BA3-CA5ADE3DA08B}" type="datetimeFigureOut">
               <a:rPr lang="en-US" smtClean="0"/>
-              <a:t>5/1/14</a:t>
+              <a:t>5/4/14</a:t>
             </a:fld>
             <a:endParaRPr lang="en-US"/>
           </a:p>
@@ -1766,7 +1768,7 @@
           <a:p>
             <a:fld id="{3FFBA1A1-BC73-0D4C-8BA3-CA5ADE3DA08B}" type="datetimeFigureOut">
               <a:rPr lang="en-US" smtClean="0"/>
-              <a:t>5/1/14</a:t>
+              <a:t>5/4/14</a:t>
             </a:fld>
             <a:endParaRPr lang="en-US"/>
           </a:p>
@@ -1884,7 +1886,7 @@
           <a:p>
             <a:fld id="{3FFBA1A1-BC73-0D4C-8BA3-CA5ADE3DA08B}" type="datetimeFigureOut">
               <a:rPr lang="en-US" smtClean="0"/>
-              <a:t>5/1/14</a:t>
+              <a:t>5/4/14</a:t>
             </a:fld>
             <a:endParaRPr lang="en-US"/>
           </a:p>
@@ -1979,7 +1981,7 @@
           <a:p>
             <a:fld id="{3FFBA1A1-BC73-0D4C-8BA3-CA5ADE3DA08B}" type="datetimeFigureOut">
               <a:rPr lang="en-US" smtClean="0"/>
-              <a:t>5/1/14</a:t>
+              <a:t>5/4/14</a:t>
             </a:fld>
             <a:endParaRPr lang="en-US"/>
           </a:p>
@@ -2256,7 +2258,7 @@
           <a:p>
             <a:fld id="{3FFBA1A1-BC73-0D4C-8BA3-CA5ADE3DA08B}" type="datetimeFigureOut">
               <a:rPr lang="en-US" smtClean="0"/>
-              <a:t>5/1/14</a:t>
+              <a:t>5/4/14</a:t>
             </a:fld>
             <a:endParaRPr lang="en-US"/>
           </a:p>
@@ -2509,7 +2511,7 @@
           <a:p>
             <a:fld id="{3FFBA1A1-BC73-0D4C-8BA3-CA5ADE3DA08B}" type="datetimeFigureOut">
               <a:rPr lang="en-US" smtClean="0"/>
-              <a:t>5/1/14</a:t>
+              <a:t>5/4/14</a:t>
             </a:fld>
             <a:endParaRPr lang="en-US"/>
           </a:p>
@@ -2722,7 +2724,7 @@
           <a:p>
             <a:fld id="{3FFBA1A1-BC73-0D4C-8BA3-CA5ADE3DA08B}" type="datetimeFigureOut">
               <a:rPr lang="en-US" smtClean="0"/>
-              <a:t>5/1/14</a:t>
+              <a:t>5/4/14</a:t>
             </a:fld>
             <a:endParaRPr lang="en-US"/>
           </a:p>
@@ -3253,10 +3255,166 @@
           </a:prstGeom>
         </p:spPr>
       </p:pic>
+      <p:pic>
+        <p:nvPicPr>
+          <p:cNvPr id="4" name="Picture 3"/>
+          <p:cNvPicPr>
+            <a:picLocks noChangeAspect="1"/>
+          </p:cNvPicPr>
+          <p:nvPr/>
+        </p:nvPicPr>
+        <p:blipFill>
+          <a:blip r:embed="rId4"/>
+          <a:stretch>
+            <a:fillRect/>
+          </a:stretch>
+        </p:blipFill>
+        <p:spPr>
+          <a:xfrm>
+            <a:off x="3868116" y="918432"/>
+            <a:ext cx="1037075" cy="995354"/>
+          </a:xfrm>
+          <a:prstGeom prst="rect">
+            <a:avLst/>
+          </a:prstGeom>
+        </p:spPr>
+      </p:pic>
+      <p:pic>
+        <p:nvPicPr>
+          <p:cNvPr id="5" name="Picture 4"/>
+          <p:cNvPicPr>
+            <a:picLocks noChangeAspect="1"/>
+          </p:cNvPicPr>
+          <p:nvPr/>
+        </p:nvPicPr>
+        <p:blipFill>
+          <a:blip r:embed="rId5"/>
+          <a:stretch>
+            <a:fillRect/>
+          </a:stretch>
+        </p:blipFill>
+        <p:spPr>
+          <a:xfrm>
+            <a:off x="4151078" y="3008078"/>
+            <a:ext cx="1297222" cy="1297222"/>
+          </a:xfrm>
+          <a:prstGeom prst="rect">
+            <a:avLst/>
+          </a:prstGeom>
+        </p:spPr>
+      </p:pic>
     </p:spTree>
     <p:extLst>
       <p:ext uri="{BB962C8B-B14F-4D97-AF65-F5344CB8AC3E}">
         <p14:creationId xmlns:p14="http://schemas.microsoft.com/office/powerpoint/2010/main" val="297976187"/>
+      </p:ext>
+    </p:extLst>
+  </p:cSld>
+  <p:clrMapOvr>
+    <a:masterClrMapping/>
+  </p:clrMapOvr>
+</p:sld>
+</file>
+
+<file path=ppt/slides/slide4.xml><?xml version="1.0" encoding="utf-8"?>
+<p:sld xmlns:a="http://schemas.openxmlformats.org/drawingml/2006/main" xmlns:r="http://schemas.openxmlformats.org/officeDocument/2006/relationships" xmlns:p="http://schemas.openxmlformats.org/presentationml/2006/main">
+  <p:cSld>
+    <p:spTree>
+      <p:nvGrpSpPr>
+        <p:cNvPr id="1" name=""/>
+        <p:cNvGrpSpPr/>
+        <p:nvPr/>
+      </p:nvGrpSpPr>
+      <p:grpSpPr>
+        <a:xfrm>
+          <a:off x="0" y="0"/>
+          <a:ext cx="0" cy="0"/>
+          <a:chOff x="0" y="0"/>
+          <a:chExt cx="0" cy="0"/>
+        </a:xfrm>
+      </p:grpSpPr>
+      <p:pic>
+        <p:nvPicPr>
+          <p:cNvPr id="2" name="Picture 1"/>
+          <p:cNvPicPr>
+            <a:picLocks noChangeAspect="1"/>
+          </p:cNvPicPr>
+          <p:nvPr/>
+        </p:nvPicPr>
+        <p:blipFill>
+          <a:blip r:embed="rId2"/>
+          <a:stretch>
+            <a:fillRect/>
+          </a:stretch>
+        </p:blipFill>
+        <p:spPr>
+          <a:xfrm>
+            <a:off x="1143000" y="0"/>
+            <a:ext cx="6858000" cy="6858000"/>
+          </a:xfrm>
+          <a:prstGeom prst="rect">
+            <a:avLst/>
+          </a:prstGeom>
+        </p:spPr>
+      </p:pic>
+    </p:spTree>
+    <p:extLst>
+      <p:ext uri="{BB962C8B-B14F-4D97-AF65-F5344CB8AC3E}">
+        <p14:creationId xmlns:p14="http://schemas.microsoft.com/office/powerpoint/2010/main" val="3451829463"/>
+      </p:ext>
+    </p:extLst>
+  </p:cSld>
+  <p:clrMapOvr>
+    <a:masterClrMapping/>
+  </p:clrMapOvr>
+</p:sld>
+</file>
+
+<file path=ppt/slides/slide5.xml><?xml version="1.0" encoding="utf-8"?>
+<p:sld xmlns:a="http://schemas.openxmlformats.org/drawingml/2006/main" xmlns:r="http://schemas.openxmlformats.org/officeDocument/2006/relationships" xmlns:p="http://schemas.openxmlformats.org/presentationml/2006/main">
+  <p:cSld>
+    <p:spTree>
+      <p:nvGrpSpPr>
+        <p:cNvPr id="1" name=""/>
+        <p:cNvGrpSpPr/>
+        <p:nvPr/>
+      </p:nvGrpSpPr>
+      <p:grpSpPr>
+        <a:xfrm>
+          <a:off x="0" y="0"/>
+          <a:ext cx="0" cy="0"/>
+          <a:chOff x="0" y="0"/>
+          <a:chExt cx="0" cy="0"/>
+        </a:xfrm>
+      </p:grpSpPr>
+      <p:pic>
+        <p:nvPicPr>
+          <p:cNvPr id="2" name="Picture 1"/>
+          <p:cNvPicPr>
+            <a:picLocks noChangeAspect="1"/>
+          </p:cNvPicPr>
+          <p:nvPr/>
+        </p:nvPicPr>
+        <p:blipFill>
+          <a:blip r:embed="rId2"/>
+          <a:stretch>
+            <a:fillRect/>
+          </a:stretch>
+        </p:blipFill>
+        <p:spPr>
+          <a:xfrm>
+            <a:off x="1143000" y="0"/>
+            <a:ext cx="6858000" cy="6858000"/>
+          </a:xfrm>
+          <a:prstGeom prst="rect">
+            <a:avLst/>
+          </a:prstGeom>
+        </p:spPr>
+      </p:pic>
+    </p:spTree>
+    <p:extLst>
+      <p:ext uri="{BB962C8B-B14F-4D97-AF65-F5344CB8AC3E}">
+        <p14:creationId xmlns:p14="http://schemas.microsoft.com/office/powerpoint/2010/main" val="873962938"/>
       </p:ext>
     </p:extLst>
   </p:cSld>

</xml_diff>